<commit_message>
name of diploma changed
</commit_message>
<xml_diff>
--- a/docs/VatolinRP.pptx
+++ b/docs/VatolinRP.pptx
@@ -316,7 +316,7 @@
             <a:fld id="{B61BEF0D-F0BB-DE4B-95CE-6DB70DBA9567}" type="datetimeFigureOut">
               <a:rPr lang="en-US" dirty="0"/>
               <a:pPr/>
-              <a:t>25-May-17</a:t>
+              <a:t>27-May-17</a:t>
             </a:fld>
             <a:endParaRPr lang="en-US" dirty="0"/>
           </a:p>
@@ -749,7 +749,7 @@
             <a:fld id="{B61BEF0D-F0BB-DE4B-95CE-6DB70DBA9567}" type="datetimeFigureOut">
               <a:rPr lang="en-US" dirty="0"/>
               <a:pPr/>
-              <a:t>25-May-17</a:t>
+              <a:t>27-May-17</a:t>
             </a:fld>
             <a:endParaRPr lang="en-US" dirty="0"/>
           </a:p>
@@ -996,7 +996,7 @@
             <a:fld id="{B61BEF0D-F0BB-DE4B-95CE-6DB70DBA9567}" type="datetimeFigureOut">
               <a:rPr lang="en-US" dirty="0"/>
               <a:pPr/>
-              <a:t>25-May-17</a:t>
+              <a:t>27-May-17</a:t>
             </a:fld>
             <a:endParaRPr lang="en-US" dirty="0"/>
           </a:p>
@@ -1301,7 +1301,7 @@
             <a:fld id="{B61BEF0D-F0BB-DE4B-95CE-6DB70DBA9567}" type="datetimeFigureOut">
               <a:rPr lang="en-US" dirty="0"/>
               <a:pPr/>
-              <a:t>25-May-17</a:t>
+              <a:t>27-May-17</a:t>
             </a:fld>
             <a:endParaRPr lang="en-US" dirty="0"/>
           </a:p>
@@ -1616,7 +1616,7 @@
             <a:fld id="{B61BEF0D-F0BB-DE4B-95CE-6DB70DBA9567}" type="datetimeFigureOut">
               <a:rPr lang="en-US" dirty="0"/>
               <a:pPr/>
-              <a:t>25-May-17</a:t>
+              <a:t>27-May-17</a:t>
             </a:fld>
             <a:endParaRPr lang="en-US" dirty="0"/>
           </a:p>
@@ -1915,7 +1915,7 @@
             <a:fld id="{B61BEF0D-F0BB-DE4B-95CE-6DB70DBA9567}" type="datetimeFigureOut">
               <a:rPr lang="en-US" dirty="0"/>
               <a:pPr/>
-              <a:t>25-May-17</a:t>
+              <a:t>27-May-17</a:t>
             </a:fld>
             <a:endParaRPr lang="en-US" dirty="0"/>
           </a:p>
@@ -2279,7 +2279,7 @@
             <a:fld id="{B61BEF0D-F0BB-DE4B-95CE-6DB70DBA9567}" type="datetimeFigureOut">
               <a:rPr lang="en-US" dirty="0"/>
               <a:pPr/>
-              <a:t>25-May-17</a:t>
+              <a:t>27-May-17</a:t>
             </a:fld>
             <a:endParaRPr lang="en-US" dirty="0"/>
           </a:p>
@@ -2450,7 +2450,7 @@
             <a:fld id="{B61BEF0D-F0BB-DE4B-95CE-6DB70DBA9567}" type="datetimeFigureOut">
               <a:rPr lang="en-US" dirty="0"/>
               <a:pPr/>
-              <a:t>25-May-17</a:t>
+              <a:t>27-May-17</a:t>
             </a:fld>
             <a:endParaRPr lang="en-US" dirty="0"/>
           </a:p>
@@ -2627,7 +2627,7 @@
             <a:fld id="{B61BEF0D-F0BB-DE4B-95CE-6DB70DBA9567}" type="datetimeFigureOut">
               <a:rPr lang="en-US" dirty="0"/>
               <a:pPr/>
-              <a:t>25-May-17</a:t>
+              <a:t>27-May-17</a:t>
             </a:fld>
             <a:endParaRPr lang="en-US" dirty="0"/>
           </a:p>
@@ -2794,7 +2794,7 @@
             <a:fld id="{B61BEF0D-F0BB-DE4B-95CE-6DB70DBA9567}" type="datetimeFigureOut">
               <a:rPr lang="en-US" dirty="0"/>
               <a:pPr/>
-              <a:t>25-May-17</a:t>
+              <a:t>27-May-17</a:t>
             </a:fld>
             <a:endParaRPr lang="en-US" dirty="0"/>
           </a:p>
@@ -3041,7 +3041,7 @@
             <a:fld id="{B61BEF0D-F0BB-DE4B-95CE-6DB70DBA9567}" type="datetimeFigureOut">
               <a:rPr lang="en-US" dirty="0"/>
               <a:pPr/>
-              <a:t>25-May-17</a:t>
+              <a:t>27-May-17</a:t>
             </a:fld>
             <a:endParaRPr lang="en-US" dirty="0"/>
           </a:p>
@@ -3274,7 +3274,7 @@
             <a:fld id="{B61BEF0D-F0BB-DE4B-95CE-6DB70DBA9567}" type="datetimeFigureOut">
               <a:rPr lang="en-US" dirty="0"/>
               <a:pPr/>
-              <a:t>25-May-17</a:t>
+              <a:t>27-May-17</a:t>
             </a:fld>
             <a:endParaRPr lang="en-US" dirty="0"/>
           </a:p>
@@ -3653,7 +3653,7 @@
             <a:fld id="{B61BEF0D-F0BB-DE4B-95CE-6DB70DBA9567}" type="datetimeFigureOut">
               <a:rPr lang="en-US" dirty="0"/>
               <a:pPr/>
-              <a:t>25-May-17</a:t>
+              <a:t>27-May-17</a:t>
             </a:fld>
             <a:endParaRPr lang="en-US" dirty="0"/>
           </a:p>
@@ -3768,7 +3768,7 @@
             <a:fld id="{B61BEF0D-F0BB-DE4B-95CE-6DB70DBA9567}" type="datetimeFigureOut">
               <a:rPr lang="en-US" dirty="0"/>
               <a:pPr/>
-              <a:t>25-May-17</a:t>
+              <a:t>27-May-17</a:t>
             </a:fld>
             <a:endParaRPr lang="en-US" dirty="0"/>
           </a:p>
@@ -3860,7 +3860,7 @@
             <a:fld id="{B61BEF0D-F0BB-DE4B-95CE-6DB70DBA9567}" type="datetimeFigureOut">
               <a:rPr lang="en-US" dirty="0"/>
               <a:pPr/>
-              <a:t>25-May-17</a:t>
+              <a:t>27-May-17</a:t>
             </a:fld>
             <a:endParaRPr lang="en-US" dirty="0"/>
           </a:p>
@@ -4112,7 +4112,7 @@
             <a:fld id="{B61BEF0D-F0BB-DE4B-95CE-6DB70DBA9567}" type="datetimeFigureOut">
               <a:rPr lang="en-US" dirty="0"/>
               <a:pPr/>
-              <a:t>25-May-17</a:t>
+              <a:t>27-May-17</a:t>
             </a:fld>
             <a:endParaRPr lang="en-US" dirty="0"/>
           </a:p>
@@ -4392,7 +4392,7 @@
             <a:fld id="{B61BEF0D-F0BB-DE4B-95CE-6DB70DBA9567}" type="datetimeFigureOut">
               <a:rPr lang="en-US" dirty="0"/>
               <a:pPr/>
-              <a:t>25-May-17</a:t>
+              <a:t>27-May-17</a:t>
             </a:fld>
             <a:endParaRPr lang="en-US" dirty="0"/>
           </a:p>
@@ -4795,7 +4795,7 @@
             <a:fld id="{B61BEF0D-F0BB-DE4B-95CE-6DB70DBA9567}" type="datetimeFigureOut">
               <a:rPr lang="en-US" dirty="0"/>
               <a:pPr/>
-              <a:t>25-May-17</a:t>
+              <a:t>27-May-17</a:t>
             </a:fld>
             <a:endParaRPr lang="en-US" dirty="0"/>
           </a:p>
@@ -5463,8 +5463,16 @@
               </a:rPr>
             </a:br>
             <a:r>
+              <a:rPr lang="ru-RU" sz="1400" b="1" dirty="0" err="1" smtClean="0"/>
+              <a:t>РеализациЯ</a:t>
+            </a:r>
+            <a:r>
+              <a:rPr lang="ru-RU" sz="1400" b="1" dirty="0" smtClean="0"/>
+              <a:t> </a:t>
+            </a:r>
+            <a:r>
               <a:rPr lang="ru-RU" sz="1400" b="1" dirty="0"/>
-              <a:t>КОМПЬЮТЕРНЫЙ МОДУЛЬ КОНТРОЛЯ СИСТЕМЫ ВЕБ-СЛУЖБ НА БАЗЕ РАСПРЕДЕЛЕННЫХ ВЫЧИСЛЕНИЙ</a:t>
+              <a:t>модуля контроля системы веб-служб на базе распределенных вычислений</a:t>
             </a:r>
             <a:r>
               <a:rPr lang="ru-RU" sz="1400" dirty="0">
@@ -5750,13 +5758,6 @@
               </a:rPr>
               <a:t>доцент, кандидат физико-математических наук С.В. Марков</a:t>
             </a:r>
-            <a:endParaRPr lang="ru-RU" sz="1400" dirty="0">
-              <a:solidFill>
-                <a:schemeClr val="tx1"/>
-              </a:solidFill>
-              <a:latin typeface="Times New Roman" panose="02020603050405020304" pitchFamily="18" charset="0"/>
-              <a:cs typeface="Times New Roman" panose="02020603050405020304" pitchFamily="18" charset="0"/>
-            </a:endParaRPr>
           </a:p>
         </p:txBody>
       </p:sp>

</xml_diff>

<commit_message>
conclusion updated in presentation
</commit_message>
<xml_diff>
--- a/docs/VatolinRP.pptx
+++ b/docs/VatolinRP.pptx
@@ -209,7 +209,7 @@
           <a:p>
             <a:fld id="{28259261-A06E-4889-B13E-D697D32CA4FD}" type="datetimeFigureOut">
               <a:rPr lang="ru-RU" smtClean="0"/>
-              <a:t>06.06.2017</a:t>
+              <a:t>07.06.2017</a:t>
             </a:fld>
             <a:endParaRPr lang="ru-RU"/>
           </a:p>
@@ -1004,7 +1004,7 @@
           <a:p>
             <a:fld id="{5A5919E8-B2EB-40BB-BE7A-A5EF9BE85FEF}" type="datetime1">
               <a:rPr lang="en-US" smtClean="0"/>
-              <a:t>06-Jun-17</a:t>
+              <a:t>07-Jun-17</a:t>
             </a:fld>
             <a:endParaRPr lang="en-US" dirty="0"/>
           </a:p>
@@ -1440,7 +1440,7 @@
           <a:p>
             <a:fld id="{A3E16DE4-25DB-46C5-A889-0618EC90F324}" type="datetime1">
               <a:rPr lang="en-US" smtClean="0"/>
-              <a:t>06-Jun-17</a:t>
+              <a:t>07-Jun-17</a:t>
             </a:fld>
             <a:endParaRPr lang="en-US" dirty="0"/>
           </a:p>
@@ -1690,7 +1690,7 @@
           <a:p>
             <a:fld id="{7F808487-E809-47A8-A20E-FAF97D2B854C}" type="datetime1">
               <a:rPr lang="en-US" smtClean="0"/>
-              <a:t>06-Jun-17</a:t>
+              <a:t>07-Jun-17</a:t>
             </a:fld>
             <a:endParaRPr lang="en-US" dirty="0"/>
           </a:p>
@@ -1998,7 +1998,7 @@
           <a:p>
             <a:fld id="{9A375A46-15B6-47B9-B237-298FFFA2FD44}" type="datetime1">
               <a:rPr lang="en-US" smtClean="0"/>
-              <a:t>06-Jun-17</a:t>
+              <a:t>07-Jun-17</a:t>
             </a:fld>
             <a:endParaRPr lang="en-US" dirty="0"/>
           </a:p>
@@ -2316,7 +2316,7 @@
           <a:p>
             <a:fld id="{283F5C00-6F59-4ACA-B2F3-BD2B1BCA3B6E}" type="datetime1">
               <a:rPr lang="en-US" smtClean="0"/>
-              <a:t>06-Jun-17</a:t>
+              <a:t>07-Jun-17</a:t>
             </a:fld>
             <a:endParaRPr lang="en-US" dirty="0"/>
           </a:p>
@@ -2618,7 +2618,7 @@
           <a:p>
             <a:fld id="{7977D106-AADE-4E97-91EE-1132090FDB49}" type="datetime1">
               <a:rPr lang="en-US" smtClean="0"/>
-              <a:t>06-Jun-17</a:t>
+              <a:t>07-Jun-17</a:t>
             </a:fld>
             <a:endParaRPr lang="en-US" dirty="0"/>
           </a:p>
@@ -2985,7 +2985,7 @@
           <a:p>
             <a:fld id="{0DA22011-569E-4140-8D98-9089A203C85F}" type="datetime1">
               <a:rPr lang="en-US" smtClean="0"/>
-              <a:t>06-Jun-17</a:t>
+              <a:t>07-Jun-17</a:t>
             </a:fld>
             <a:endParaRPr lang="en-US" dirty="0"/>
           </a:p>
@@ -3159,7 +3159,7 @@
           <a:p>
             <a:fld id="{2BEC4D0C-FAC8-463C-812B-81CE7C1C23F2}" type="datetime1">
               <a:rPr lang="en-US" smtClean="0"/>
-              <a:t>06-Jun-17</a:t>
+              <a:t>07-Jun-17</a:t>
             </a:fld>
             <a:endParaRPr lang="en-US" dirty="0"/>
           </a:p>
@@ -3339,7 +3339,7 @@
           <a:p>
             <a:fld id="{9723E81D-7C55-48C9-B718-9A191221EC5E}" type="datetime1">
               <a:rPr lang="en-US" smtClean="0"/>
-              <a:t>06-Jun-17</a:t>
+              <a:t>07-Jun-17</a:t>
             </a:fld>
             <a:endParaRPr lang="en-US" dirty="0"/>
           </a:p>
@@ -3509,7 +3509,7 @@
           <a:p>
             <a:fld id="{23F9B089-D664-42D9-8F38-90D7F08A88A8}" type="datetime1">
               <a:rPr lang="en-US" smtClean="0"/>
-              <a:t>06-Jun-17</a:t>
+              <a:t>07-Jun-17</a:t>
             </a:fld>
             <a:endParaRPr lang="en-US" dirty="0"/>
           </a:p>
@@ -3759,7 +3759,7 @@
           <a:p>
             <a:fld id="{8A13BF5D-37E5-4927-8B05-BA63B5AC3042}" type="datetime1">
               <a:rPr lang="en-US" smtClean="0"/>
-              <a:t>06-Jun-17</a:t>
+              <a:t>07-Jun-17</a:t>
             </a:fld>
             <a:endParaRPr lang="en-US" dirty="0"/>
           </a:p>
@@ -3995,7 +3995,7 @@
           <a:p>
             <a:fld id="{A15D0CCE-8FE0-43BA-AD16-01A257332518}" type="datetime1">
               <a:rPr lang="en-US" smtClean="0"/>
-              <a:t>06-Jun-17</a:t>
+              <a:t>07-Jun-17</a:t>
             </a:fld>
             <a:endParaRPr lang="en-US" dirty="0"/>
           </a:p>
@@ -4377,7 +4377,7 @@
           <a:p>
             <a:fld id="{76B9B707-5009-4E46-B981-66ABD1C48A6C}" type="datetime1">
               <a:rPr lang="en-US" smtClean="0"/>
-              <a:t>06-Jun-17</a:t>
+              <a:t>07-Jun-17</a:t>
             </a:fld>
             <a:endParaRPr lang="en-US" dirty="0"/>
           </a:p>
@@ -4495,7 +4495,7 @@
           <a:p>
             <a:fld id="{6AD8FD92-5782-41C9-A98A-0DD1D7B2F76A}" type="datetime1">
               <a:rPr lang="en-US" smtClean="0"/>
-              <a:t>06-Jun-17</a:t>
+              <a:t>07-Jun-17</a:t>
             </a:fld>
             <a:endParaRPr lang="en-US" dirty="0"/>
           </a:p>
@@ -4590,7 +4590,7 @@
           <a:p>
             <a:fld id="{98D8145A-D957-47CE-9557-036ABA10B742}" type="datetime1">
               <a:rPr lang="en-US" smtClean="0"/>
-              <a:t>06-Jun-17</a:t>
+              <a:t>07-Jun-17</a:t>
             </a:fld>
             <a:endParaRPr lang="en-US" dirty="0"/>
           </a:p>
@@ -4845,7 +4845,7 @@
           <a:p>
             <a:fld id="{BF47936E-E4BF-4635-A09C-CDFC55E0A6A2}" type="datetime1">
               <a:rPr lang="en-US" smtClean="0"/>
-              <a:t>06-Jun-17</a:t>
+              <a:t>07-Jun-17</a:t>
             </a:fld>
             <a:endParaRPr lang="en-US" dirty="0"/>
           </a:p>
@@ -5128,7 +5128,7 @@
           <a:p>
             <a:fld id="{412B5D79-87A3-4CFF-A891-D83E77C0635F}" type="datetime1">
               <a:rPr lang="en-US" smtClean="0"/>
-              <a:t>06-Jun-17</a:t>
+              <a:t>07-Jun-17</a:t>
             </a:fld>
             <a:endParaRPr lang="en-US" dirty="0"/>
           </a:p>
@@ -5534,7 +5534,7 @@
           <a:p>
             <a:fld id="{58307D8D-E4B5-4EF5-A18F-5B2CFE3F852C}" type="datetime1">
               <a:rPr lang="en-US" smtClean="0"/>
-              <a:t>06-Jun-17</a:t>
+              <a:t>07-Jun-17</a:t>
             </a:fld>
             <a:endParaRPr lang="en-US" dirty="0"/>
           </a:p>
@@ -6657,16 +6657,30 @@
             <p:ph type="ftr" sz="quarter" idx="11"/>
           </p:nvPr>
         </p:nvSpPr>
-        <p:spPr/>
+        <p:spPr>
+          <a:xfrm>
+            <a:off x="0" y="6286502"/>
+            <a:ext cx="12192000" cy="365125"/>
+          </a:xfrm>
+        </p:spPr>
         <p:txBody>
           <a:bodyPr/>
           <a:lstStyle/>
           <a:p>
-            <a:r>
-              <a:rPr lang="ru-RU" smtClean="0"/>
+            <a:pPr algn="ctr"/>
+            <a:r>
+              <a:rPr lang="ru-RU" sz="1200" dirty="0" smtClean="0">
+                <a:solidFill>
+                  <a:schemeClr val="tx1"/>
+                </a:solidFill>
+              </a:rPr>
               <a:t>Ватолин Р. П. "Реализация модуля контроля системы веб-служб на базе распределенных вычислений" 2017</a:t>
             </a:r>
-            <a:endParaRPr lang="en-US" dirty="0"/>
+            <a:endParaRPr lang="en-US" sz="1200" dirty="0">
+              <a:solidFill>
+                <a:schemeClr val="tx1"/>
+              </a:solidFill>
+            </a:endParaRPr>
           </a:p>
         </p:txBody>
       </p:sp>
@@ -6756,7 +6770,7 @@
         </p:blipFill>
         <p:spPr bwMode="auto">
           <a:xfrm>
-            <a:off x="773112" y="1712277"/>
+            <a:off x="989012" y="1428431"/>
             <a:ext cx="3494088" cy="2072323"/>
           </a:xfrm>
           <a:prstGeom prst="rect">
@@ -6789,7 +6803,7 @@
         </p:blipFill>
         <p:spPr bwMode="auto">
           <a:xfrm>
-            <a:off x="5918199" y="1712277"/>
+            <a:off x="6400799" y="1428431"/>
             <a:ext cx="3832225" cy="2072323"/>
           </a:xfrm>
           <a:prstGeom prst="rect">
@@ -6821,7 +6835,7 @@
         </p:blipFill>
         <p:spPr>
           <a:xfrm>
-            <a:off x="5918198" y="4438490"/>
+            <a:off x="6400799" y="4120989"/>
             <a:ext cx="3832225" cy="1900553"/>
           </a:xfrm>
           <a:prstGeom prst="rect">
@@ -6849,7 +6863,7 @@
         </p:blipFill>
         <p:spPr>
           <a:xfrm>
-            <a:off x="773113" y="4438490"/>
+            <a:off x="989012" y="4120990"/>
             <a:ext cx="3494088" cy="1900553"/>
           </a:xfrm>
           <a:prstGeom prst="rect">
@@ -6867,16 +6881,30 @@
             <p:ph type="ftr" sz="quarter" idx="11"/>
           </p:nvPr>
         </p:nvSpPr>
-        <p:spPr/>
+        <p:spPr>
+          <a:xfrm>
+            <a:off x="0" y="6339043"/>
+            <a:ext cx="12192000" cy="365125"/>
+          </a:xfrm>
+        </p:spPr>
         <p:txBody>
           <a:bodyPr/>
           <a:lstStyle/>
           <a:p>
-            <a:r>
-              <a:rPr lang="ru-RU" smtClean="0"/>
+            <a:pPr algn="ctr"/>
+            <a:r>
+              <a:rPr lang="ru-RU" sz="1200" dirty="0" smtClean="0">
+                <a:solidFill>
+                  <a:schemeClr val="tx1"/>
+                </a:solidFill>
+              </a:rPr>
               <a:t>Ватолин Р. П. "Реализация модуля контроля системы веб-служб на базе распределенных вычислений" 2017</a:t>
             </a:r>
-            <a:endParaRPr lang="en-US" dirty="0"/>
+            <a:endParaRPr lang="en-US" sz="1200" dirty="0">
+              <a:solidFill>
+                <a:schemeClr val="tx1"/>
+              </a:solidFill>
+            </a:endParaRPr>
           </a:p>
         </p:txBody>
       </p:sp>
@@ -6967,8 +6995,8 @@
         </p:blipFill>
         <p:spPr>
           <a:xfrm>
-            <a:off x="1011237" y="1727199"/>
-            <a:ext cx="2493963" cy="4964060"/>
+            <a:off x="985837" y="1727199"/>
+            <a:ext cx="2493963" cy="4151259"/>
           </a:xfrm>
           <a:prstGeom prst="rect">
             <a:avLst/>
@@ -7015,16 +7043,30 @@
             <p:ph type="ftr" sz="quarter" idx="11"/>
           </p:nvPr>
         </p:nvSpPr>
-        <p:spPr/>
+        <p:spPr>
+          <a:xfrm>
+            <a:off x="0" y="6172200"/>
+            <a:ext cx="12192000" cy="365125"/>
+          </a:xfrm>
+        </p:spPr>
         <p:txBody>
           <a:bodyPr/>
           <a:lstStyle/>
           <a:p>
-            <a:r>
-              <a:rPr lang="ru-RU" smtClean="0"/>
+            <a:pPr algn="ctr"/>
+            <a:r>
+              <a:rPr lang="ru-RU" sz="1200" dirty="0" smtClean="0">
+                <a:solidFill>
+                  <a:schemeClr val="tx1"/>
+                </a:solidFill>
+              </a:rPr>
               <a:t>Ватолин Р. П. "Реализация модуля контроля системы веб-служб на базе распределенных вычислений" 2017</a:t>
             </a:r>
-            <a:endParaRPr lang="en-US" dirty="0"/>
+            <a:endParaRPr lang="en-US" sz="1200" dirty="0">
+              <a:solidFill>
+                <a:schemeClr val="tx1"/>
+              </a:solidFill>
+            </a:endParaRPr>
           </a:p>
         </p:txBody>
       </p:sp>
@@ -7102,7 +7144,7 @@
         <p:spPr>
           <a:xfrm>
             <a:off x="927100" y="1638299"/>
-            <a:ext cx="7327900" cy="4801314"/>
+            <a:ext cx="7327900" cy="4524315"/>
           </a:xfrm>
           <a:prstGeom prst="rect">
             <a:avLst/>
@@ -7120,23 +7162,7 @@
             </a:pPr>
             <a:r>
               <a:rPr lang="ru-RU" dirty="0" smtClean="0"/>
-              <a:t>Ознакомившись с </a:t>
-            </a:r>
-            <a:r>
-              <a:rPr lang="ru-RU" dirty="0" err="1" smtClean="0"/>
-              <a:t>фреймворком</a:t>
-            </a:r>
-            <a:r>
-              <a:rPr lang="ru-RU" dirty="0" smtClean="0"/>
-              <a:t> </a:t>
-            </a:r>
-            <a:r>
-              <a:rPr lang="en-US" dirty="0" smtClean="0"/>
-              <a:t>Apache Storm</a:t>
-            </a:r>
-            <a:r>
-              <a:rPr lang="ru-RU" dirty="0" smtClean="0"/>
-              <a:t> при создании вычислительного модуля, можно с уверенностью сказать, что любая подобная задача с анализом данных может быть быстро и эффективно реализована</a:t>
+              <a:t>Ознакомившись с большим количеством веб-служб, можно сделать вывод, что каждая из них имеет свою погрешность в определенной зоне на карте мира в определенный промежуток времени</a:t>
             </a:r>
             <a:r>
               <a:rPr lang="en-US" dirty="0" smtClean="0"/>
@@ -7150,23 +7176,19 @@
             </a:pPr>
             <a:r>
               <a:rPr lang="ru-RU" dirty="0" smtClean="0"/>
-              <a:t>Получив опыт с интеграцией между множеством сторонних веб-служб реализующих </a:t>
-            </a:r>
-            <a:r>
-              <a:rPr lang="en-US" dirty="0" smtClean="0"/>
-              <a:t>REST </a:t>
+              <a:t>Самым лучшем поставщиком прогнозов для городо</a:t>
+            </a:r>
+            <a:r>
+              <a:rPr lang="ru-RU" dirty="0"/>
+              <a:t>в</a:t>
             </a:r>
             <a:r>
               <a:rPr lang="ru-RU" dirty="0" smtClean="0"/>
-              <a:t>архитектуру, можно смело сделать вывод о том, что в плане надежности современные сервисы предоставляют множество преимуществ над теми сервисами, которые работают, используя </a:t>
-            </a:r>
-            <a:r>
-              <a:rPr lang="en-US" dirty="0" smtClean="0"/>
-              <a:t>SOAP </a:t>
-            </a:r>
-            <a:r>
-              <a:rPr lang="ru-RU" dirty="0" smtClean="0"/>
-              <a:t>протокол передачи данных</a:t>
+              <a:t> РБ оказалась компания </a:t>
+            </a:r>
+            <a:r>
+              <a:rPr lang="en-US" dirty="0" err="1" smtClean="0"/>
+              <a:t>AccuWeather</a:t>
             </a:r>
             <a:r>
               <a:rPr lang="en-US" dirty="0" smtClean="0"/>
@@ -7180,23 +7202,15 @@
             </a:pPr>
             <a:r>
               <a:rPr lang="ru-RU" dirty="0" smtClean="0"/>
-              <a:t>Ознакомившись и применив на практике навыки работы с </a:t>
-            </a:r>
-            <a:r>
-              <a:rPr lang="en-US" dirty="0" smtClean="0"/>
-              <a:t>CSV</a:t>
+              <a:t>В ходе работы была обнаружена необходимость в финансовых вложениях, чтобы осуществить аналитику в полной ее  мере, что </a:t>
+            </a:r>
+            <a:r>
+              <a:rPr lang="ru-RU" dirty="0" err="1" smtClean="0"/>
+              <a:t>ограничела</a:t>
             </a:r>
             <a:r>
               <a:rPr lang="ru-RU" dirty="0" smtClean="0"/>
-              <a:t>-файлами, стоит особо подчеркнуть их приспособленность к работе в среде </a:t>
-            </a:r>
-            <a:r>
-              <a:rPr lang="en-US" dirty="0" smtClean="0"/>
-              <a:t>Microsoft Excel</a:t>
-            </a:r>
-            <a:r>
-              <a:rPr lang="en-US" dirty="0"/>
-              <a:t>;</a:t>
+              <a:t> возможности данного программного модуля.</a:t>
             </a:r>
             <a:endParaRPr lang="ru-RU" dirty="0" smtClean="0"/>
           </a:p>
@@ -7206,6 +7220,32 @@
             </a:pPr>
             <a:r>
               <a:rPr lang="ru-RU" dirty="0" smtClean="0"/>
+              <a:t>Ознакомившись и применив на практике навыки работы с </a:t>
+            </a:r>
+            <a:r>
+              <a:rPr lang="en-US" dirty="0" smtClean="0"/>
+              <a:t>CSV</a:t>
+            </a:r>
+            <a:r>
+              <a:rPr lang="ru-RU" dirty="0" smtClean="0"/>
+              <a:t>-файлами, стоит особо подчеркнуть их приспособленность к работе в среде </a:t>
+            </a:r>
+            <a:r>
+              <a:rPr lang="en-US" dirty="0" smtClean="0"/>
+              <a:t>Microsoft Excel</a:t>
+            </a:r>
+            <a:r>
+              <a:rPr lang="en-US" dirty="0"/>
+              <a:t>;</a:t>
+            </a:r>
+            <a:endParaRPr lang="ru-RU" dirty="0" smtClean="0"/>
+          </a:p>
+          <a:p>
+            <a:pPr marL="342900" indent="-342900">
+              <a:buAutoNum type="arabicParenR"/>
+            </a:pPr>
+            <a:r>
+              <a:rPr lang="ru-RU" dirty="0" smtClean="0"/>
               <a:t>Реализовав работу с электронной рассылкой отчетов было правильным решением, так как оно не нагружает систему и не представляет финансовых трудностей.</a:t>
             </a:r>
             <a:endParaRPr lang="ru-RU" dirty="0"/>
@@ -7222,16 +7262,30 @@
             <p:ph type="ftr" sz="quarter" idx="11"/>
           </p:nvPr>
         </p:nvSpPr>
-        <p:spPr/>
+        <p:spPr>
+          <a:xfrm>
+            <a:off x="0" y="6172200"/>
+            <a:ext cx="12192000" cy="365125"/>
+          </a:xfrm>
+        </p:spPr>
         <p:txBody>
           <a:bodyPr/>
           <a:lstStyle/>
           <a:p>
-            <a:r>
-              <a:rPr lang="ru-RU" smtClean="0"/>
+            <a:pPr algn="ctr"/>
+            <a:r>
+              <a:rPr lang="ru-RU" sz="1200" dirty="0" smtClean="0">
+                <a:solidFill>
+                  <a:schemeClr val="tx1"/>
+                </a:solidFill>
+              </a:rPr>
               <a:t>Ватолин Р. П. "Реализация модуля контроля системы веб-служб на базе распределенных вычислений" 2017</a:t>
             </a:r>
-            <a:endParaRPr lang="en-US" dirty="0"/>
+            <a:endParaRPr lang="en-US" sz="1200" dirty="0">
+              <a:solidFill>
+                <a:schemeClr val="tx1"/>
+              </a:solidFill>
+            </a:endParaRPr>
           </a:p>
         </p:txBody>
       </p:sp>
@@ -7326,7 +7380,6 @@
               <a:rPr lang="ru-RU" dirty="0" smtClean="0"/>
               <a:t>На сегодняшний день существует множество метеослужб, предоставляющие свои прогнозы, получение наиболее точного очень важно по многим причинам, в том числе:</a:t>
             </a:r>
-            <a:endParaRPr lang="ru-RU" dirty="0" smtClean="0"/>
           </a:p>
           <a:p>
             <a:pPr marL="342900" indent="-342900">
@@ -7348,7 +7401,6 @@
               <a:rPr lang="en-US" dirty="0" smtClean="0"/>
               <a:t>;</a:t>
             </a:r>
-            <a:endParaRPr lang="en-US" dirty="0" smtClean="0"/>
           </a:p>
           <a:p>
             <a:pPr marL="342900" indent="-342900">
@@ -7366,7 +7418,6 @@
               <a:rPr lang="en-US" dirty="0" smtClean="0"/>
               <a:t>;</a:t>
             </a:r>
-            <a:endParaRPr lang="en-US" dirty="0" smtClean="0"/>
           </a:p>
           <a:p>
             <a:pPr marL="342900" indent="-342900">
@@ -7390,7 +7441,6 @@
               <a:rPr lang="ru-RU" dirty="0" smtClean="0"/>
               <a:t>синоптика все еще является актуальной задачей.</a:t>
             </a:r>
-            <a:endParaRPr lang="ru-RU" dirty="0" smtClean="0"/>
           </a:p>
         </p:txBody>
       </p:sp>
@@ -7406,14 +7456,15 @@
         </p:nvSpPr>
         <p:spPr>
           <a:xfrm>
-            <a:off x="1813718" y="6064024"/>
-            <a:ext cx="8485188" cy="365125"/>
+            <a:off x="0" y="6102124"/>
+            <a:ext cx="12192000" cy="365125"/>
           </a:xfrm>
         </p:spPr>
         <p:txBody>
           <a:bodyPr/>
           <a:lstStyle/>
           <a:p>
+            <a:pPr algn="ctr"/>
             <a:r>
               <a:rPr lang="ru-RU" sz="1200" dirty="0" smtClean="0">
                 <a:solidFill>
@@ -7597,7 +7648,6 @@
               <a:rPr lang="ru-RU" dirty="0" smtClean="0"/>
               <a:t>», который в свою очередь представил следующие недостатки:</a:t>
             </a:r>
-            <a:endParaRPr lang="ru-RU" dirty="0" smtClean="0"/>
           </a:p>
           <a:p>
             <a:pPr marL="342900" indent="-342900">
@@ -7605,11 +7655,7 @@
             </a:pPr>
             <a:r>
               <a:rPr lang="ru-RU" dirty="0" smtClean="0"/>
-              <a:t>Анализ данных происходит только 4 раза в сутки, что является достаточн</a:t>
-            </a:r>
-            <a:r>
-              <a:rPr lang="ru-RU" dirty="0" smtClean="0"/>
-              <a:t>ым, для корректной аналитики</a:t>
+              <a:t>Анализ данных происходит только 4 раза в сутки, что является достаточным, для корректной аналитики</a:t>
             </a:r>
             <a:r>
               <a:rPr lang="en-US" dirty="0" smtClean="0"/>
@@ -7680,14 +7726,15 @@
         </p:nvSpPr>
         <p:spPr>
           <a:xfrm>
-            <a:off x="1813718" y="6064024"/>
-            <a:ext cx="8485188" cy="365125"/>
+            <a:off x="0" y="6267224"/>
+            <a:ext cx="12192000" cy="365125"/>
           </a:xfrm>
         </p:spPr>
         <p:txBody>
           <a:bodyPr/>
           <a:lstStyle/>
           <a:p>
+            <a:pPr algn="ctr"/>
             <a:r>
               <a:rPr lang="ru-RU" sz="1200" dirty="0" smtClean="0">
                 <a:solidFill>
@@ -8094,14 +8141,15 @@
         </p:nvSpPr>
         <p:spPr>
           <a:xfrm>
-            <a:off x="1534116" y="6158823"/>
-            <a:ext cx="8561388" cy="365125"/>
+            <a:off x="12700" y="6251570"/>
+            <a:ext cx="12179300" cy="365125"/>
           </a:xfrm>
         </p:spPr>
         <p:txBody>
           <a:bodyPr/>
           <a:lstStyle/>
           <a:p>
+            <a:pPr algn="ctr"/>
             <a:r>
               <a:rPr lang="ru-RU" sz="1200" dirty="0" smtClean="0">
                 <a:solidFill>
@@ -8430,14 +8478,15 @@
         </p:nvSpPr>
         <p:spPr>
           <a:xfrm>
-            <a:off x="1654968" y="6146800"/>
-            <a:ext cx="8624888" cy="365125"/>
+            <a:off x="0" y="6273800"/>
+            <a:ext cx="12192000" cy="365125"/>
           </a:xfrm>
         </p:spPr>
         <p:txBody>
           <a:bodyPr/>
           <a:lstStyle/>
           <a:p>
+            <a:pPr algn="ctr"/>
             <a:r>
               <a:rPr lang="ru-RU" sz="1200" dirty="0" smtClean="0">
                 <a:solidFill>
@@ -8629,14 +8678,15 @@
         </p:nvSpPr>
         <p:spPr>
           <a:xfrm>
-            <a:off x="1910556" y="6083300"/>
-            <a:ext cx="8548688" cy="365125"/>
+            <a:off x="0" y="6171141"/>
+            <a:ext cx="12192000" cy="365125"/>
           </a:xfrm>
         </p:spPr>
         <p:txBody>
           <a:bodyPr/>
           <a:lstStyle/>
           <a:p>
+            <a:pPr algn="ctr"/>
             <a:r>
               <a:rPr lang="ru-RU" sz="1200" dirty="0" smtClean="0">
                 <a:solidFill>
@@ -8793,16 +8843,30 @@
             <p:ph type="ftr" sz="quarter" idx="11"/>
           </p:nvPr>
         </p:nvSpPr>
-        <p:spPr/>
+        <p:spPr>
+          <a:xfrm>
+            <a:off x="0" y="6323846"/>
+            <a:ext cx="12192000" cy="365125"/>
+          </a:xfrm>
+        </p:spPr>
         <p:txBody>
           <a:bodyPr/>
           <a:lstStyle/>
           <a:p>
-            <a:r>
-              <a:rPr lang="ru-RU" smtClean="0"/>
+            <a:pPr algn="ctr"/>
+            <a:r>
+              <a:rPr lang="ru-RU" sz="1200" dirty="0" smtClean="0">
+                <a:solidFill>
+                  <a:schemeClr val="tx1"/>
+                </a:solidFill>
+              </a:rPr>
               <a:t>Ватолин Р. П. "Реализация модуля контроля системы веб-служб на базе распределенных вычислений" 2017</a:t>
             </a:r>
-            <a:endParaRPr lang="en-US" dirty="0"/>
+            <a:endParaRPr lang="en-US" sz="1200" dirty="0">
+              <a:solidFill>
+                <a:schemeClr val="tx1"/>
+              </a:solidFill>
+            </a:endParaRPr>
           </a:p>
         </p:txBody>
       </p:sp>
@@ -9342,16 +9406,30 @@
             <p:ph type="ftr" sz="quarter" idx="11"/>
           </p:nvPr>
         </p:nvSpPr>
-        <p:spPr/>
+        <p:spPr>
+          <a:xfrm>
+            <a:off x="0" y="6210300"/>
+            <a:ext cx="12192000" cy="365125"/>
+          </a:xfrm>
+        </p:spPr>
         <p:txBody>
           <a:bodyPr/>
           <a:lstStyle/>
           <a:p>
-            <a:r>
-              <a:rPr lang="ru-RU" smtClean="0"/>
+            <a:pPr algn="ctr"/>
+            <a:r>
+              <a:rPr lang="ru-RU" sz="1200" dirty="0" smtClean="0">
+                <a:solidFill>
+                  <a:schemeClr val="tx1"/>
+                </a:solidFill>
+              </a:rPr>
               <a:t>Ватолин Р. П. "Реализация модуля контроля системы веб-служб на базе распределенных вычислений" 2017</a:t>
             </a:r>
-            <a:endParaRPr lang="en-US" dirty="0"/>
+            <a:endParaRPr lang="en-US" sz="1200" dirty="0">
+              <a:solidFill>
+                <a:schemeClr val="tx1"/>
+              </a:solidFill>
+            </a:endParaRPr>
           </a:p>
         </p:txBody>
       </p:sp>
@@ -9536,16 +9614,30 @@
             <p:ph type="ftr" sz="quarter" idx="11"/>
           </p:nvPr>
         </p:nvSpPr>
-        <p:spPr/>
+        <p:spPr>
+          <a:xfrm>
+            <a:off x="0" y="6297081"/>
+            <a:ext cx="12192000" cy="365125"/>
+          </a:xfrm>
+        </p:spPr>
         <p:txBody>
           <a:bodyPr/>
           <a:lstStyle/>
           <a:p>
-            <a:r>
-              <a:rPr lang="ru-RU" smtClean="0"/>
+            <a:pPr algn="ctr"/>
+            <a:r>
+              <a:rPr lang="ru-RU" sz="1200" dirty="0" smtClean="0">
+                <a:solidFill>
+                  <a:schemeClr val="tx1"/>
+                </a:solidFill>
+              </a:rPr>
               <a:t>Ватолин Р. П. "Реализация модуля контроля системы веб-служб на базе распределенных вычислений" 2017</a:t>
             </a:r>
-            <a:endParaRPr lang="en-US" dirty="0"/>
+            <a:endParaRPr lang="en-US" sz="1200" dirty="0">
+              <a:solidFill>
+                <a:schemeClr val="tx1"/>
+              </a:solidFill>
+            </a:endParaRPr>
           </a:p>
         </p:txBody>
       </p:sp>

</xml_diff>